<commit_message>
Updated assets - logo and diagrams and etc.
</commit_message>
<xml_diff>
--- a/PayFive/assets/diagrams/architectureDiagram.pptx
+++ b/PayFive/assets/diagrams/architectureDiagram.pptx
@@ -289,7 +289,7 @@
           <a:p>
             <a:fld id="{82ACF042-9345-214C-81A2-6E7895ABF203}" type="datetimeFigureOut">
               <a:rPr lang="en-US" smtClean="0"/>
-              <a:t>3/27/14</a:t>
+              <a:t>4/2/14</a:t>
             </a:fld>
             <a:endParaRPr lang="en-US"/>
           </a:p>
@@ -459,7 +459,7 @@
           <a:p>
             <a:fld id="{82ACF042-9345-214C-81A2-6E7895ABF203}" type="datetimeFigureOut">
               <a:rPr lang="en-US" smtClean="0"/>
-              <a:t>3/27/14</a:t>
+              <a:t>4/2/14</a:t>
             </a:fld>
             <a:endParaRPr lang="en-US"/>
           </a:p>
@@ -639,7 +639,7 @@
           <a:p>
             <a:fld id="{82ACF042-9345-214C-81A2-6E7895ABF203}" type="datetimeFigureOut">
               <a:rPr lang="en-US" smtClean="0"/>
-              <a:t>3/27/14</a:t>
+              <a:t>4/2/14</a:t>
             </a:fld>
             <a:endParaRPr lang="en-US"/>
           </a:p>
@@ -809,7 +809,7 @@
           <a:p>
             <a:fld id="{82ACF042-9345-214C-81A2-6E7895ABF203}" type="datetimeFigureOut">
               <a:rPr lang="en-US" smtClean="0"/>
-              <a:t>3/27/14</a:t>
+              <a:t>4/2/14</a:t>
             </a:fld>
             <a:endParaRPr lang="en-US"/>
           </a:p>
@@ -1055,7 +1055,7 @@
           <a:p>
             <a:fld id="{82ACF042-9345-214C-81A2-6E7895ABF203}" type="datetimeFigureOut">
               <a:rPr lang="en-US" smtClean="0"/>
-              <a:t>3/27/14</a:t>
+              <a:t>4/2/14</a:t>
             </a:fld>
             <a:endParaRPr lang="en-US"/>
           </a:p>
@@ -1343,7 +1343,7 @@
           <a:p>
             <a:fld id="{82ACF042-9345-214C-81A2-6E7895ABF203}" type="datetimeFigureOut">
               <a:rPr lang="en-US" smtClean="0"/>
-              <a:t>3/27/14</a:t>
+              <a:t>4/2/14</a:t>
             </a:fld>
             <a:endParaRPr lang="en-US"/>
           </a:p>
@@ -1765,7 +1765,7 @@
           <a:p>
             <a:fld id="{82ACF042-9345-214C-81A2-6E7895ABF203}" type="datetimeFigureOut">
               <a:rPr lang="en-US" smtClean="0"/>
-              <a:t>3/27/14</a:t>
+              <a:t>4/2/14</a:t>
             </a:fld>
             <a:endParaRPr lang="en-US"/>
           </a:p>
@@ -1883,7 +1883,7 @@
           <a:p>
             <a:fld id="{82ACF042-9345-214C-81A2-6E7895ABF203}" type="datetimeFigureOut">
               <a:rPr lang="en-US" smtClean="0"/>
-              <a:t>3/27/14</a:t>
+              <a:t>4/2/14</a:t>
             </a:fld>
             <a:endParaRPr lang="en-US"/>
           </a:p>
@@ -1978,7 +1978,7 @@
           <a:p>
             <a:fld id="{82ACF042-9345-214C-81A2-6E7895ABF203}" type="datetimeFigureOut">
               <a:rPr lang="en-US" smtClean="0"/>
-              <a:t>3/27/14</a:t>
+              <a:t>4/2/14</a:t>
             </a:fld>
             <a:endParaRPr lang="en-US"/>
           </a:p>
@@ -2255,7 +2255,7 @@
           <a:p>
             <a:fld id="{82ACF042-9345-214C-81A2-6E7895ABF203}" type="datetimeFigureOut">
               <a:rPr lang="en-US" smtClean="0"/>
-              <a:t>3/27/14</a:t>
+              <a:t>4/2/14</a:t>
             </a:fld>
             <a:endParaRPr lang="en-US"/>
           </a:p>
@@ -2508,7 +2508,7 @@
           <a:p>
             <a:fld id="{82ACF042-9345-214C-81A2-6E7895ABF203}" type="datetimeFigureOut">
               <a:rPr lang="en-US" smtClean="0"/>
-              <a:t>3/27/14</a:t>
+              <a:t>4/2/14</a:t>
             </a:fld>
             <a:endParaRPr lang="en-US"/>
           </a:p>
@@ -2721,7 +2721,7 @@
           <a:p>
             <a:fld id="{82ACF042-9345-214C-81A2-6E7895ABF203}" type="datetimeFigureOut">
               <a:rPr lang="en-US" smtClean="0"/>
-              <a:t>3/27/14</a:t>
+              <a:t>4/2/14</a:t>
             </a:fld>
             <a:endParaRPr lang="en-US"/>
           </a:p>
@@ -4166,7 +4166,7 @@
       </p:cxnSp>
       <p:pic>
         <p:nvPicPr>
-          <p:cNvPr id="2" name="Picture 1" descr="payfive_logo_v5.png"/>
+          <p:cNvPr id="3" name="Picture 2" descr="payfive_logo_v6.png"/>
           <p:cNvPicPr>
             <a:picLocks noChangeAspect="1"/>
           </p:cNvPicPr>
@@ -4186,8 +4186,8 @@
         </p:blipFill>
         <p:spPr>
           <a:xfrm>
-            <a:off x="233680" y="312384"/>
-            <a:ext cx="974344" cy="978464"/>
+            <a:off x="233680" y="100586"/>
+            <a:ext cx="1525775" cy="1525775"/>
           </a:xfrm>
           <a:prstGeom prst="rect">
             <a:avLst/>
@@ -4246,7 +4246,7 @@
         </p:blipFill>
         <p:spPr>
           <a:xfrm>
-            <a:off x="4812378" y="3187106"/>
+            <a:off x="4904692" y="3226804"/>
             <a:ext cx="831824" cy="831824"/>
           </a:xfrm>
           <a:prstGeom prst="rect">
@@ -4276,7 +4276,7 @@
         </p:blipFill>
         <p:spPr>
           <a:xfrm>
-            <a:off x="4812378" y="2085096"/>
+            <a:off x="4904692" y="2094899"/>
             <a:ext cx="831824" cy="831824"/>
           </a:xfrm>
           <a:prstGeom prst="rect">
@@ -4336,7 +4336,7 @@
         </p:blipFill>
         <p:spPr>
           <a:xfrm>
-            <a:off x="2557935" y="1684986"/>
+            <a:off x="3418969" y="1290848"/>
             <a:ext cx="789915" cy="789915"/>
           </a:xfrm>
           <a:prstGeom prst="rect">
@@ -4366,7 +4366,7 @@
         </p:blipFill>
         <p:spPr>
           <a:xfrm>
-            <a:off x="4640669" y="2082802"/>
+            <a:off x="4691469" y="2082802"/>
             <a:ext cx="335513" cy="335513"/>
           </a:xfrm>
           <a:prstGeom prst="rect">
@@ -4412,7 +4412,7 @@
         </p:nvSpPr>
         <p:spPr>
           <a:xfrm>
-            <a:off x="5030900" y="3320408"/>
+            <a:off x="5123214" y="3360106"/>
             <a:ext cx="374949" cy="550448"/>
           </a:xfrm>
           <a:prstGeom prst="rect">
@@ -4471,7 +4471,7 @@
         </p:blipFill>
         <p:spPr>
           <a:xfrm>
-            <a:off x="5071632" y="3431516"/>
+            <a:off x="5163946" y="3471214"/>
             <a:ext cx="309151" cy="309151"/>
           </a:xfrm>
           <a:prstGeom prst="rect">
@@ -4517,7 +4517,7 @@
         </p:nvSpPr>
         <p:spPr>
           <a:xfrm>
-            <a:off x="2281678" y="1220526"/>
+            <a:off x="3028692" y="765977"/>
             <a:ext cx="1430737" cy="553998"/>
           </a:xfrm>
           <a:prstGeom prst="rect">
@@ -4580,20 +4580,7 @@
                 <a:latin typeface="Avenir Book"/>
                 <a:cs typeface="Avenir Book"/>
               </a:rPr>
-              <a:t> </a:t>
-            </a:r>
-            <a:r>
-              <a:rPr lang="en-US" sz="1000" dirty="0" smtClean="0">
-                <a:solidFill>
-                  <a:schemeClr val="tx1">
-                    <a:lumMod val="65000"/>
-                    <a:lumOff val="35000"/>
-                  </a:schemeClr>
-                </a:solidFill>
-                <a:latin typeface="Avenir Book"/>
-                <a:cs typeface="Avenir Book"/>
-              </a:rPr>
-              <a:t>library (via smartphone camera)</a:t>
+              <a:t> library (via smartphone camera)</a:t>
             </a:r>
             <a:endParaRPr lang="en-US" sz="1000" dirty="0">
               <a:solidFill>
@@ -4618,8 +4605,8 @@
         </p:nvCxnSpPr>
         <p:spPr>
           <a:xfrm flipV="1">
-            <a:off x="5547744" y="2510811"/>
-            <a:ext cx="947914" cy="920706"/>
+            <a:off x="5644202" y="2510811"/>
+            <a:ext cx="851456" cy="910255"/>
           </a:xfrm>
           <a:prstGeom prst="straightConnector1">
             <a:avLst/>
@@ -4654,7 +4641,7 @@
         </p:nvSpPr>
         <p:spPr>
           <a:xfrm>
-            <a:off x="6329791" y="3160244"/>
+            <a:off x="6329790" y="3117271"/>
             <a:ext cx="1859169" cy="707886"/>
           </a:xfrm>
           <a:prstGeom prst="rect">
@@ -4679,10 +4666,10 @@
                 <a:latin typeface="Avenir Book"/>
                 <a:cs typeface="Avenir Book"/>
               </a:rPr>
-              <a:t>Generate </a:t>
-            </a:r>
-            <a:r>
-              <a:rPr lang="en-US" sz="1000" dirty="0" smtClean="0">
+              <a:t>Generate (on screen) and read QR</a:t>
+            </a:r>
+            <a:r>
+              <a:rPr lang="en-US" sz="1000" dirty="0">
                 <a:solidFill>
                   <a:schemeClr val="tx1">
                     <a:lumMod val="65000"/>
@@ -4692,7 +4679,7 @@
                 <a:latin typeface="Avenir Book"/>
                 <a:cs typeface="Avenir Book"/>
               </a:rPr>
-              <a:t>(on screen) and </a:t>
+              <a:t> </a:t>
             </a:r>
             <a:r>
               <a:rPr lang="en-US" sz="1000" dirty="0" smtClean="0">
@@ -4705,10 +4692,10 @@
                 <a:latin typeface="Avenir Book"/>
                 <a:cs typeface="Avenir Book"/>
               </a:rPr>
-              <a:t>read </a:t>
-            </a:r>
-            <a:r>
-              <a:rPr lang="en-US" sz="1000" dirty="0" smtClean="0">
+              <a:t>code (via smartphone camera) using </a:t>
+            </a:r>
+            <a:r>
+              <a:rPr lang="en-US" sz="1000" i="1" dirty="0" err="1" smtClean="0">
                 <a:solidFill>
                   <a:schemeClr val="tx1">
                     <a:lumMod val="65000"/>
@@ -4718,10 +4705,10 @@
                 <a:latin typeface="Avenir Book"/>
                 <a:cs typeface="Avenir Book"/>
               </a:rPr>
-              <a:t>QR</a:t>
-            </a:r>
-            <a:r>
-              <a:rPr lang="en-US" sz="1000" dirty="0">
+              <a:t>ZXing</a:t>
+            </a:r>
+            <a:r>
+              <a:rPr lang="en-US" sz="1000" dirty="0" smtClean="0">
                 <a:solidFill>
                   <a:schemeClr val="tx1">
                     <a:lumMod val="65000"/>
@@ -4731,10 +4718,10 @@
                 <a:latin typeface="Avenir Book"/>
                 <a:cs typeface="Avenir Book"/>
               </a:rPr>
-              <a:t> </a:t>
-            </a:r>
-            <a:r>
-              <a:rPr lang="en-US" sz="1000" dirty="0" smtClean="0">
+              <a:t> and </a:t>
+            </a:r>
+            <a:r>
+              <a:rPr lang="en-US" sz="1000" i="1" dirty="0" err="1" smtClean="0">
                 <a:solidFill>
                   <a:schemeClr val="tx1">
                     <a:lumMod val="65000"/>
@@ -4744,7 +4731,7 @@
                 <a:latin typeface="Avenir Book"/>
                 <a:cs typeface="Avenir Book"/>
               </a:rPr>
-              <a:t>c</a:t>
+              <a:t>ZBar</a:t>
             </a:r>
             <a:r>
               <a:rPr lang="en-US" sz="1000" dirty="0" smtClean="0">
@@ -4757,85 +4744,7 @@
                 <a:latin typeface="Avenir Book"/>
                 <a:cs typeface="Avenir Book"/>
               </a:rPr>
-              <a:t>ode (via smartphone camera) </a:t>
-            </a:r>
-            <a:r>
-              <a:rPr lang="en-US" sz="1000" dirty="0" smtClean="0">
-                <a:solidFill>
-                  <a:schemeClr val="tx1">
-                    <a:lumMod val="65000"/>
-                    <a:lumOff val="35000"/>
-                  </a:schemeClr>
-                </a:solidFill>
-                <a:latin typeface="Avenir Book"/>
-                <a:cs typeface="Avenir Book"/>
-              </a:rPr>
-              <a:t>using </a:t>
-            </a:r>
-            <a:r>
-              <a:rPr lang="en-US" sz="1000" i="1" dirty="0" err="1" smtClean="0">
-                <a:solidFill>
-                  <a:schemeClr val="tx1">
-                    <a:lumMod val="65000"/>
-                    <a:lumOff val="35000"/>
-                  </a:schemeClr>
-                </a:solidFill>
-                <a:latin typeface="Avenir Book"/>
-                <a:cs typeface="Avenir Book"/>
-              </a:rPr>
-              <a:t>ZXing</a:t>
-            </a:r>
-            <a:r>
-              <a:rPr lang="en-US" sz="1000" dirty="0" smtClean="0">
-                <a:solidFill>
-                  <a:schemeClr val="tx1">
-                    <a:lumMod val="65000"/>
-                    <a:lumOff val="35000"/>
-                  </a:schemeClr>
-                </a:solidFill>
-                <a:latin typeface="Avenir Book"/>
-                <a:cs typeface="Avenir Book"/>
-              </a:rPr>
-              <a:t> and </a:t>
-            </a:r>
-            <a:r>
-              <a:rPr lang="en-US" sz="1000" i="1" dirty="0" err="1" smtClean="0">
-                <a:solidFill>
-                  <a:schemeClr val="tx1">
-                    <a:lumMod val="65000"/>
-                    <a:lumOff val="35000"/>
-                  </a:schemeClr>
-                </a:solidFill>
-                <a:latin typeface="Avenir Book"/>
-                <a:cs typeface="Avenir Book"/>
-              </a:rPr>
-              <a:t>ZBar</a:t>
-            </a:r>
-            <a:r>
-              <a:rPr lang="en-US" sz="1000" dirty="0" smtClean="0">
-                <a:solidFill>
-                  <a:schemeClr val="tx1">
-                    <a:lumMod val="65000"/>
-                    <a:lumOff val="35000"/>
-                  </a:schemeClr>
-                </a:solidFill>
-                <a:latin typeface="Avenir Book"/>
-                <a:cs typeface="Avenir Book"/>
-              </a:rPr>
-              <a:t> </a:t>
-            </a:r>
-            <a:r>
-              <a:rPr lang="en-US" sz="1000" dirty="0" smtClean="0">
-                <a:solidFill>
-                  <a:schemeClr val="tx1">
-                    <a:lumMod val="65000"/>
-                    <a:lumOff val="35000"/>
-                  </a:schemeClr>
-                </a:solidFill>
-                <a:latin typeface="Avenir Book"/>
-                <a:cs typeface="Avenir Book"/>
-              </a:rPr>
-              <a:t>library</a:t>
+              <a:t> library</a:t>
             </a:r>
             <a:endParaRPr lang="en-US" sz="1000" dirty="0">
               <a:solidFill>
@@ -4858,8 +4767,8 @@
         </p:nvCxnSpPr>
         <p:spPr>
           <a:xfrm>
-            <a:off x="3444240" y="2094899"/>
-            <a:ext cx="1056640" cy="155661"/>
+            <a:off x="4155440" y="1849120"/>
+            <a:ext cx="477520" cy="401440"/>
           </a:xfrm>
           <a:prstGeom prst="straightConnector1">
             <a:avLst/>
@@ -4889,13 +4798,15 @@
       <p:cxnSp>
         <p:nvCxnSpPr>
           <p:cNvPr id="33" name="Straight Arrow Connector 32"/>
-          <p:cNvCxnSpPr/>
+          <p:cNvCxnSpPr>
+            <a:stCxn id="38" idx="0"/>
+          </p:cNvCxnSpPr>
           <p:nvPr/>
         </p:nvCxnSpPr>
         <p:spPr>
           <a:xfrm flipV="1">
-            <a:off x="5262526" y="1168906"/>
-            <a:ext cx="285218" cy="854451"/>
+            <a:off x="5324773" y="1168908"/>
+            <a:ext cx="202651" cy="700858"/>
           </a:xfrm>
           <a:prstGeom prst="straightConnector1">
             <a:avLst/>
@@ -4994,10 +4905,10 @@
                 <a:latin typeface="Avenir Book"/>
                 <a:cs typeface="Avenir Book"/>
               </a:rPr>
-              <a:t>PayPal </a:t>
-            </a:r>
-            <a:r>
-              <a:rPr lang="en-US" sz="1000" i="1" dirty="0" smtClean="0">
+              <a:t>PayPal Android SDK</a:t>
+            </a:r>
+            <a:r>
+              <a:rPr lang="en-US" sz="1000" dirty="0" smtClean="0">
                 <a:solidFill>
                   <a:schemeClr val="tx1">
                     <a:lumMod val="65000"/>
@@ -5007,33 +4918,7 @@
                 <a:latin typeface="Avenir Book"/>
                 <a:cs typeface="Avenir Book"/>
               </a:rPr>
-              <a:t>Android SDK</a:t>
-            </a:r>
-            <a:r>
-              <a:rPr lang="en-US" sz="1000" dirty="0" smtClean="0">
-                <a:solidFill>
-                  <a:schemeClr val="tx1">
-                    <a:lumMod val="65000"/>
-                    <a:lumOff val="35000"/>
-                  </a:schemeClr>
-                </a:solidFill>
-                <a:latin typeface="Avenir Book"/>
-                <a:cs typeface="Avenir Book"/>
-              </a:rPr>
-              <a:t> </a:t>
-            </a:r>
-            <a:r>
-              <a:rPr lang="en-US" sz="1000" dirty="0" smtClean="0">
-                <a:solidFill>
-                  <a:schemeClr val="tx1">
-                    <a:lumMod val="65000"/>
-                    <a:lumOff val="35000"/>
-                  </a:schemeClr>
-                </a:solidFill>
-                <a:latin typeface="Avenir Book"/>
-                <a:cs typeface="Avenir Book"/>
-              </a:rPr>
-              <a:t>library</a:t>
+              <a:t> library</a:t>
             </a:r>
             <a:endParaRPr lang="en-US" sz="1000" dirty="0">
               <a:solidFill>
@@ -5070,7 +4955,7 @@
         </p:blipFill>
         <p:spPr>
           <a:xfrm>
-            <a:off x="3563130" y="2753493"/>
+            <a:off x="3634250" y="2753493"/>
             <a:ext cx="683750" cy="683750"/>
           </a:xfrm>
           <a:prstGeom prst="rect">
@@ -5081,13 +4966,15 @@
       <p:cxnSp>
         <p:nvCxnSpPr>
           <p:cNvPr id="42" name="Straight Arrow Connector 41"/>
-          <p:cNvCxnSpPr/>
+          <p:cNvCxnSpPr>
+            <a:stCxn id="41" idx="0"/>
+          </p:cNvCxnSpPr>
           <p:nvPr/>
         </p:nvCxnSpPr>
         <p:spPr>
           <a:xfrm flipH="1" flipV="1">
             <a:off x="5644202" y="1186399"/>
-            <a:ext cx="1247638" cy="836958"/>
+            <a:ext cx="1247638" cy="683367"/>
           </a:xfrm>
           <a:prstGeom prst="straightConnector1">
             <a:avLst/>
@@ -5122,7 +5009,7 @@
         </p:nvSpPr>
         <p:spPr>
           <a:xfrm>
-            <a:off x="2832255" y="3709702"/>
+            <a:off x="2903375" y="3533476"/>
             <a:ext cx="1556054" cy="553998"/>
           </a:xfrm>
           <a:prstGeom prst="rect">
@@ -5196,8 +5083,8 @@
         </p:nvCxnSpPr>
         <p:spPr>
           <a:xfrm flipH="1">
-            <a:off x="4246880" y="2740415"/>
-            <a:ext cx="648006" cy="186308"/>
+            <a:off x="4287520" y="2740415"/>
+            <a:ext cx="731575" cy="186308"/>
           </a:xfrm>
           <a:prstGeom prst="straightConnector1">
             <a:avLst/>
@@ -5324,13 +5211,6 @@
               </a:rPr>
               <a:t>Architecture</a:t>
             </a:r>
-            <a:endParaRPr lang="en-US" sz="2200" dirty="0" smtClean="0">
-              <a:solidFill>
-                <a:srgbClr val="1D6E46"/>
-              </a:solidFill>
-              <a:latin typeface="Avenir Book"/>
-              <a:cs typeface="Avenir Book"/>
-            </a:endParaRPr>
           </a:p>
           <a:p>
             <a:endParaRPr lang="en-US" sz="2400" dirty="0">
@@ -5378,9 +5258,113 @@
           </a:fontRef>
         </p:style>
       </p:cxnSp>
+      <p:cxnSp>
+        <p:nvCxnSpPr>
+          <p:cNvPr id="35" name="Straight Arrow Connector 34"/>
+          <p:cNvCxnSpPr>
+            <a:stCxn id="5" idx="2"/>
+          </p:cNvCxnSpPr>
+          <p:nvPr/>
+        </p:nvCxnSpPr>
+        <p:spPr>
+          <a:xfrm>
+            <a:off x="5320604" y="2926723"/>
+            <a:ext cx="0" cy="233521"/>
+          </a:xfrm>
+          <a:prstGeom prst="straightConnector1">
+            <a:avLst/>
+          </a:prstGeom>
+          <a:ln>
+            <a:solidFill>
+              <a:srgbClr val="1D6E46"/>
+            </a:solidFill>
+            <a:tailEnd type="arrow"/>
+          </a:ln>
+        </p:spPr>
+        <p:style>
+          <a:lnRef idx="2">
+            <a:schemeClr val="accent1"/>
+          </a:lnRef>
+          <a:fillRef idx="0">
+            <a:schemeClr val="accent1"/>
+          </a:fillRef>
+          <a:effectRef idx="1">
+            <a:schemeClr val="accent1"/>
+          </a:effectRef>
+          <a:fontRef idx="minor">
+            <a:schemeClr val="tx1"/>
+          </a:fontRef>
+        </p:style>
+      </p:cxnSp>
+      <p:sp>
+        <p:nvSpPr>
+          <p:cNvPr id="38" name="TextBox 37"/>
+          <p:cNvSpPr txBox="1"/>
+          <p:nvPr/>
+        </p:nvSpPr>
+        <p:spPr>
+          <a:xfrm>
+            <a:off x="4979621" y="1869766"/>
+            <a:ext cx="690303" cy="253916"/>
+          </a:xfrm>
+          <a:prstGeom prst="rect">
+            <a:avLst/>
+          </a:prstGeom>
+          <a:noFill/>
+        </p:spPr>
+        <p:txBody>
+          <a:bodyPr wrap="square" rtlCol="0">
+            <a:spAutoFit/>
+          </a:bodyPr>
+          <a:lstStyle/>
+          <a:p>
+            <a:pPr algn="ctr"/>
+            <a:r>
+              <a:rPr lang="en-US" sz="1050" dirty="0" smtClean="0">
+                <a:latin typeface="Avenir Book"/>
+                <a:cs typeface="Avenir Book"/>
+              </a:rPr>
+              <a:t>Receiver</a:t>
+            </a:r>
+          </a:p>
+        </p:txBody>
+      </p:sp>
+      <p:sp>
+        <p:nvSpPr>
+          <p:cNvPr id="41" name="TextBox 40"/>
+          <p:cNvSpPr txBox="1"/>
+          <p:nvPr/>
+        </p:nvSpPr>
+        <p:spPr>
+          <a:xfrm>
+            <a:off x="6546688" y="1869766"/>
+            <a:ext cx="690303" cy="253916"/>
+          </a:xfrm>
+          <a:prstGeom prst="rect">
+            <a:avLst/>
+          </a:prstGeom>
+          <a:noFill/>
+        </p:spPr>
+        <p:txBody>
+          <a:bodyPr wrap="square" rtlCol="0">
+            <a:spAutoFit/>
+          </a:bodyPr>
+          <a:lstStyle/>
+          <a:p>
+            <a:pPr algn="ctr"/>
+            <a:r>
+              <a:rPr lang="en-US" sz="1050" dirty="0" smtClean="0">
+                <a:latin typeface="Avenir Book"/>
+                <a:cs typeface="Avenir Book"/>
+              </a:rPr>
+              <a:t>Sender</a:t>
+            </a:r>
+          </a:p>
+        </p:txBody>
+      </p:sp>
       <p:pic>
         <p:nvPicPr>
-          <p:cNvPr id="31" name="Picture 30" descr="payfive_logo_v5.png"/>
+          <p:cNvPr id="36" name="Picture 35" descr="payfive_logo_v6.png"/>
           <p:cNvPicPr>
             <a:picLocks noChangeAspect="1"/>
           </p:cNvPicPr>
@@ -5400,8 +5384,8 @@
         </p:blipFill>
         <p:spPr>
           <a:xfrm>
-            <a:off x="233680" y="312384"/>
-            <a:ext cx="974344" cy="978464"/>
+            <a:off x="233680" y="100586"/>
+            <a:ext cx="1525775" cy="1525775"/>
           </a:xfrm>
           <a:prstGeom prst="rect">
             <a:avLst/>

</xml_diff>